<commit_message>
added use case paragraph 4
</commit_message>
<xml_diff>
--- a/other/presentations/Git , GitHub Tutorial.pptx
+++ b/other/presentations/Git , GitHub Tutorial.pptx
@@ -217,7 +217,7 @@
           <a:effectLst/>
           <a:extLst>
             <a:ext uri="{91240B29-F687-4f45-9708-019B960494DF}">
-              <a14:hiddenLine xmlns="" xmlns:a14="http://schemas.microsoft.com/office/drawing/2010/main" w="9525">
+              <a14:hiddenLine xmlns:a14="http://schemas.microsoft.com/office/drawing/2010/main" xmlns="" w="9525">
                 <a:solidFill>
                   <a:srgbClr val="000000"/>
                 </a:solidFill>
@@ -1727,7 +1727,7 @@
           <a:ln/>
           <a:extLst>
             <a:ext uri="{91240B29-F687-4f45-9708-019B960494DF}">
-              <a14:hiddenLine xmlns="" xmlns:a14="http://schemas.microsoft.com/office/drawing/2010/main" w="9525">
+              <a14:hiddenLine xmlns:a14="http://schemas.microsoft.com/office/drawing/2010/main" xmlns="" w="9525">
                 <a:solidFill>
                   <a:srgbClr val="000000"/>
                 </a:solidFill>
@@ -1999,7 +1999,7 @@
           <a:ln/>
           <a:extLst>
             <a:ext uri="{91240B29-F687-4f45-9708-019B960494DF}">
-              <a14:hiddenLine xmlns="" xmlns:a14="http://schemas.microsoft.com/office/drawing/2010/main" w="9525">
+              <a14:hiddenLine xmlns:a14="http://schemas.microsoft.com/office/drawing/2010/main" xmlns="" w="9525">
                 <a:solidFill>
                   <a:srgbClr val="000000"/>
                 </a:solidFill>
@@ -2279,7 +2279,7 @@
           <a:ln/>
           <a:extLst>
             <a:ext uri="{91240B29-F687-4f45-9708-019B960494DF}">
-              <a14:hiddenLine xmlns="" xmlns:a14="http://schemas.microsoft.com/office/drawing/2010/main" w="9525">
+              <a14:hiddenLine xmlns:a14="http://schemas.microsoft.com/office/drawing/2010/main" xmlns="" w="9525">
                 <a:solidFill>
                   <a:srgbClr val="000000"/>
                 </a:solidFill>
@@ -2899,7 +2899,7 @@
           <a:ln/>
           <a:extLst>
             <a:ext uri="{91240B29-F687-4f45-9708-019B960494DF}">
-              <a14:hiddenLine xmlns="" xmlns:a14="http://schemas.microsoft.com/office/drawing/2010/main" w="9525">
+              <a14:hiddenLine xmlns:a14="http://schemas.microsoft.com/office/drawing/2010/main" xmlns="" w="9525">
                 <a:solidFill>
                   <a:srgbClr val="000000"/>
                 </a:solidFill>
@@ -3235,7 +3235,7 @@
           <a:ln/>
           <a:extLst>
             <a:ext uri="{91240B29-F687-4f45-9708-019B960494DF}">
-              <a14:hiddenLine xmlns="" xmlns:a14="http://schemas.microsoft.com/office/drawing/2010/main" w="9525">
+              <a14:hiddenLine xmlns:a14="http://schemas.microsoft.com/office/drawing/2010/main" xmlns="" w="9525">
                 <a:solidFill>
                   <a:srgbClr val="000000"/>
                 </a:solidFill>
@@ -3709,7 +3709,7 @@
           <a:ln/>
           <a:extLst>
             <a:ext uri="{91240B29-F687-4f45-9708-019B960494DF}">
-              <a14:hiddenLine xmlns="" xmlns:a14="http://schemas.microsoft.com/office/drawing/2010/main" w="9525">
+              <a14:hiddenLine xmlns:a14="http://schemas.microsoft.com/office/drawing/2010/main" xmlns="" w="9525">
                 <a:solidFill>
                   <a:srgbClr val="000000"/>
                 </a:solidFill>
@@ -4132,7 +4132,7 @@
           <a:ln/>
           <a:extLst>
             <a:ext uri="{91240B29-F687-4f45-9708-019B960494DF}">
-              <a14:hiddenLine xmlns="" xmlns:a14="http://schemas.microsoft.com/office/drawing/2010/main" w="9525">
+              <a14:hiddenLine xmlns:a14="http://schemas.microsoft.com/office/drawing/2010/main" xmlns="" w="9525">
                 <a:solidFill>
                   <a:srgbClr val="000000"/>
                 </a:solidFill>
@@ -6004,7 +6004,7 @@
         <p:spPr>
           <a:xfrm>
             <a:off x="273697" y="2076958"/>
-            <a:ext cx="5154483" cy="4131860"/>
+            <a:ext cx="5631803" cy="4131860"/>
           </a:xfrm>
           <a:prstGeom prst="rect">
             <a:avLst/>
@@ -6236,7 +6236,7 @@
             <a:pPr algn="just" rtl="1"/>
             <a:r>
               <a:rPr lang="he-IL" dirty="0"/>
-              <a:t>הממשק די פשוט ואפשר לראות את כל הקבצים והשינויים דרכו.</a:t>
+              <a:t>הממשק די פשוט ומאפשר לראות את כל הקבצים והשינויים דרכו.</a:t>
             </a:r>
           </a:p>
           <a:p>
@@ -6329,7 +6329,7 @@
             </a:r>
             <a:r>
               <a:rPr lang="he-IL" dirty="0"/>
-              <a:t> הוא תוכנה שפותחה על ידי </a:t>
+              <a:t> היא תוכנה שפותחה על ידי </a:t>
             </a:r>
             <a:r>
               <a:rPr lang="en-US" dirty="0"/>
@@ -6374,7 +6374,7 @@
             </a:r>
             <a:r>
               <a:rPr lang="he-IL" dirty="0"/>
-              <a:t> שלה ל</a:t>
+              <a:t> שלה ל </a:t>
             </a:r>
             <a:r>
               <a:rPr lang="en-US" dirty="0"/>

</xml_diff>